<commit_message>
Added Paragraph in ppt
</commit_message>
<xml_diff>
--- a/ASC_dbdesign.pptx
+++ b/ASC_dbdesign.pptx
@@ -13532,26 +13532,17 @@
             </a:pPr>
             <a:r>
               <a:rPr lang="en-US" dirty="0" smtClean="0"/>
-              <a:t>(paragraph form)</a:t>
+              <a:t>Soylent</a:t>
             </a:r>
-          </a:p>
-          <a:p>
+            <a:r>
+              <a:rPr lang="en-US" dirty="0"/>
+              <a:t> is a company that creates meal replacement products for on-the-go adults who do not have time to prepare nutritional, healthy meals.  Soylent’s product line includes pre-mixed drinks, powder to mix with water, and food bars. Soylent was introduced in 2014 through a crowdfunding campaign that generated about $1.5 million dollars in pre-orders. Recognizing that in this day and age many adults are looking for a quick, healthy meal, Soylent provides a solution that reduces the cost of purchasing, preparing and consuming food. Their meal replacement contains everything that the average adult needs to needs for a healthy diet without any excess fat or sugar</a:t>
+            </a:r>
             <a:r>
               <a:rPr lang="en-US" dirty="0" smtClean="0"/>
-              <a:t>Introduced 2014 w/ a crowdfunding campaign</a:t>
+              <a:t>.</a:t>
             </a:r>
-          </a:p>
-          <a:p>
-            <a:r>
-              <a:rPr lang="en-US" dirty="0" smtClean="0"/>
-              <a:t>Focuses on meal replacement products that meet all nutritional requirements for an average adult</a:t>
-            </a:r>
-          </a:p>
-          <a:p>
-            <a:r>
-              <a:rPr lang="en-US" dirty="0" smtClean="0"/>
-              <a:t>Reduces costs of purchasing, preparing, and consuming food</a:t>
-            </a:r>
+            <a:endParaRPr lang="en-US" dirty="0" smtClean="0"/>
           </a:p>
         </p:txBody>
       </p:sp>
@@ -13651,11 +13642,7 @@
                       </a:r>
                       <a:r>
                         <a:rPr lang="en-US" sz="1600" dirty="0" smtClean="0"/>
-                        <a:t> </a:t>
-                      </a:r>
-                      <a:r>
-                        <a:rPr lang="en-US" sz="1600" dirty="0" smtClean="0"/>
-                        <a:t>(PK)</a:t>
+                        <a:t> (PK)</a:t>
                       </a:r>
                     </a:p>
                     <a:p>
@@ -13751,11 +13738,7 @@
                       </a:r>
                       <a:r>
                         <a:rPr lang="en-US" sz="1600" dirty="0" smtClean="0"/>
-                        <a:t> </a:t>
-                      </a:r>
-                      <a:r>
-                        <a:rPr lang="en-US" sz="1600" dirty="0" smtClean="0"/>
-                        <a:t>(PK)</a:t>
+                        <a:t> (PK)</a:t>
                       </a:r>
                     </a:p>
                     <a:p>
@@ -13780,7 +13763,6 @@
                         <a:rPr lang="en-US" sz="1600" baseline="0" dirty="0" smtClean="0"/>
                         <a:t> (FK)</a:t>
                       </a:r>
-                      <a:endParaRPr lang="en-US" sz="1600" baseline="0" dirty="0" smtClean="0"/>
                     </a:p>
                   </a:txBody>
                   <a:tcPr/>
@@ -13906,7 +13888,6 @@
                         <a:rPr lang="en-US" sz="1600" baseline="0" dirty="0" smtClean="0"/>
                         <a:t> (PK, FK)</a:t>
                       </a:r>
-                      <a:endParaRPr lang="en-US" sz="1600" baseline="0" dirty="0" smtClean="0"/>
                     </a:p>
                   </a:txBody>
                   <a:tcPr/>
@@ -14012,7 +13993,6 @@
                         <a:rPr lang="en-US" sz="1600" baseline="0" dirty="0" smtClean="0"/>
                         <a:t> (FK)</a:t>
                       </a:r>
-                      <a:endParaRPr lang="en-US" sz="1600" baseline="0" dirty="0" smtClean="0"/>
                     </a:p>
                   </a:txBody>
                   <a:tcPr/>
@@ -14365,7 +14345,6 @@
                         <a:rPr lang="en-US" sz="1600" baseline="0" dirty="0" smtClean="0"/>
                         <a:t> (FK)</a:t>
                       </a:r>
-                      <a:endParaRPr lang="en-US" sz="1600" baseline="0" dirty="0" smtClean="0"/>
                     </a:p>
                   </a:txBody>
                   <a:tcPr/>
@@ -14468,7 +14447,6 @@
                         <a:rPr lang="en-US" sz="1600" baseline="0" dirty="0" smtClean="0"/>
                         <a:t>Discount</a:t>
                       </a:r>
-                      <a:endParaRPr lang="en-US" sz="1600" baseline="0" dirty="0" smtClean="0"/>
                     </a:p>
                   </a:txBody>
                   <a:tcPr/>

</xml_diff>